<commit_message>
Validação basica de formulario
</commit_message>
<xml_diff>
--- a/doc.pptx
+++ b/doc.pptx
@@ -6,6 +6,8 @@
   </p:sldMasterIdLst>
   <p:sldIdLst>
     <p:sldId id="256" r:id="rId2"/>
+    <p:sldId id="257" r:id="rId3"/>
+    <p:sldId id="258" r:id="rId4"/>
   </p:sldIdLst>
   <p:sldSz cx="12192000" cy="6858000"/>
   <p:notesSz cx="6858000" cy="9144000"/>
@@ -104,6 +106,11 @@
       </a:defRPr>
     </a:lvl9pPr>
   </p:defaultTextStyle>
+  <p:extLst>
+    <p:ext uri="{EFAFB233-063F-42B5-8137-9DF3F51BA10A}">
+      <p15:sldGuideLst xmlns:p15="http://schemas.microsoft.com/office/powerpoint/2012/main"/>
+    </p:ext>
+  </p:extLst>
 </p:presentation>
 </file>
 
@@ -238,7 +245,7 @@
           <a:p>
             <a:fld id="{5E67E5E5-F278-47A5-BB0A-C0EAEF511DEB}" type="datetimeFigureOut">
               <a:rPr lang="pt-BR" smtClean="0"/>
-              <a:t>13/10/2022</a:t>
+              <a:t>15/10/2022</a:t>
             </a:fld>
             <a:endParaRPr lang="pt-BR"/>
           </a:p>
@@ -408,7 +415,7 @@
           <a:p>
             <a:fld id="{5E67E5E5-F278-47A5-BB0A-C0EAEF511DEB}" type="datetimeFigureOut">
               <a:rPr lang="pt-BR" smtClean="0"/>
-              <a:t>13/10/2022</a:t>
+              <a:t>15/10/2022</a:t>
             </a:fld>
             <a:endParaRPr lang="pt-BR"/>
           </a:p>
@@ -588,7 +595,7 @@
           <a:p>
             <a:fld id="{5E67E5E5-F278-47A5-BB0A-C0EAEF511DEB}" type="datetimeFigureOut">
               <a:rPr lang="pt-BR" smtClean="0"/>
-              <a:t>13/10/2022</a:t>
+              <a:t>15/10/2022</a:t>
             </a:fld>
             <a:endParaRPr lang="pt-BR"/>
           </a:p>
@@ -758,7 +765,7 @@
           <a:p>
             <a:fld id="{5E67E5E5-F278-47A5-BB0A-C0EAEF511DEB}" type="datetimeFigureOut">
               <a:rPr lang="pt-BR" smtClean="0"/>
-              <a:t>13/10/2022</a:t>
+              <a:t>15/10/2022</a:t>
             </a:fld>
             <a:endParaRPr lang="pt-BR"/>
           </a:p>
@@ -1004,7 +1011,7 @@
           <a:p>
             <a:fld id="{5E67E5E5-F278-47A5-BB0A-C0EAEF511DEB}" type="datetimeFigureOut">
               <a:rPr lang="pt-BR" smtClean="0"/>
-              <a:t>13/10/2022</a:t>
+              <a:t>15/10/2022</a:t>
             </a:fld>
             <a:endParaRPr lang="pt-BR"/>
           </a:p>
@@ -1236,7 +1243,7 @@
           <a:p>
             <a:fld id="{5E67E5E5-F278-47A5-BB0A-C0EAEF511DEB}" type="datetimeFigureOut">
               <a:rPr lang="pt-BR" smtClean="0"/>
-              <a:t>13/10/2022</a:t>
+              <a:t>15/10/2022</a:t>
             </a:fld>
             <a:endParaRPr lang="pt-BR"/>
           </a:p>
@@ -1603,7 +1610,7 @@
           <a:p>
             <a:fld id="{5E67E5E5-F278-47A5-BB0A-C0EAEF511DEB}" type="datetimeFigureOut">
               <a:rPr lang="pt-BR" smtClean="0"/>
-              <a:t>13/10/2022</a:t>
+              <a:t>15/10/2022</a:t>
             </a:fld>
             <a:endParaRPr lang="pt-BR"/>
           </a:p>
@@ -1721,7 +1728,7 @@
           <a:p>
             <a:fld id="{5E67E5E5-F278-47A5-BB0A-C0EAEF511DEB}" type="datetimeFigureOut">
               <a:rPr lang="pt-BR" smtClean="0"/>
-              <a:t>13/10/2022</a:t>
+              <a:t>15/10/2022</a:t>
             </a:fld>
             <a:endParaRPr lang="pt-BR"/>
           </a:p>
@@ -1816,7 +1823,7 @@
           <a:p>
             <a:fld id="{5E67E5E5-F278-47A5-BB0A-C0EAEF511DEB}" type="datetimeFigureOut">
               <a:rPr lang="pt-BR" smtClean="0"/>
-              <a:t>13/10/2022</a:t>
+              <a:t>15/10/2022</a:t>
             </a:fld>
             <a:endParaRPr lang="pt-BR"/>
           </a:p>
@@ -2093,7 +2100,7 @@
           <a:p>
             <a:fld id="{5E67E5E5-F278-47A5-BB0A-C0EAEF511DEB}" type="datetimeFigureOut">
               <a:rPr lang="pt-BR" smtClean="0"/>
-              <a:t>13/10/2022</a:t>
+              <a:t>15/10/2022</a:t>
             </a:fld>
             <a:endParaRPr lang="pt-BR"/>
           </a:p>
@@ -2346,7 +2353,7 @@
           <a:p>
             <a:fld id="{5E67E5E5-F278-47A5-BB0A-C0EAEF511DEB}" type="datetimeFigureOut">
               <a:rPr lang="pt-BR" smtClean="0"/>
-              <a:t>13/10/2022</a:t>
+              <a:t>15/10/2022</a:t>
             </a:fld>
             <a:endParaRPr lang="pt-BR"/>
           </a:p>
@@ -2559,7 +2566,7 @@
           <a:p>
             <a:fld id="{5E67E5E5-F278-47A5-BB0A-C0EAEF511DEB}" type="datetimeFigureOut">
               <a:rPr lang="pt-BR" smtClean="0"/>
-              <a:t>13/10/2022</a:t>
+              <a:t>15/10/2022</a:t>
             </a:fld>
             <a:endParaRPr lang="pt-BR"/>
           </a:p>
@@ -2986,25 +2993,254 @@
           </a:bodyPr>
           <a:lstStyle/>
           <a:p>
+            <a:r>
+              <a:rPr lang="pt-BR" dirty="0" smtClean="0"/>
+              <a:t>Declaração do </a:t>
+            </a:r>
+            <a:r>
+              <a:rPr lang="pt-BR" dirty="0" err="1" smtClean="0"/>
+              <a:t>form</a:t>
+            </a:r>
+            <a:r>
+              <a:rPr lang="pt-BR" dirty="0" smtClean="0"/>
+              <a:t> </a:t>
+            </a:r>
+            <a:r>
+              <a:rPr lang="pt-BR" dirty="0" err="1" smtClean="0"/>
+              <a:t>group</a:t>
+            </a:r>
             <a:endParaRPr lang="pt-BR" dirty="0"/>
           </a:p>
         </p:txBody>
       </p:sp>
-      <p:sp>
-        <p:nvSpPr>
-          <p:cNvPr id="3" name="Subtítulo 2"/>
-          <p:cNvSpPr>
-            <a:spLocks noGrp="1"/>
-          </p:cNvSpPr>
-          <p:nvPr>
-            <p:ph type="subTitle" idx="1"/>
-          </p:nvPr>
-        </p:nvSpPr>
-        <p:spPr/>
-        <p:txBody>
-          <a:bodyPr/>
-          <a:lstStyle/>
-          <a:p>
+      <p:pic>
+        <p:nvPicPr>
+          <p:cNvPr id="4" name="Imagem 3"/>
+          <p:cNvPicPr>
+            <a:picLocks noChangeAspect="1"/>
+          </p:cNvPicPr>
+          <p:nvPr/>
+        </p:nvPicPr>
+        <p:blipFill>
+          <a:blip r:embed="rId2"/>
+          <a:stretch>
+            <a:fillRect/>
+          </a:stretch>
+        </p:blipFill>
+        <p:spPr>
+          <a:xfrm>
+            <a:off x="5801021" y="2796045"/>
+            <a:ext cx="5016758" cy="3911801"/>
+          </a:xfrm>
+          <a:prstGeom prst="rect">
+            <a:avLst/>
+          </a:prstGeom>
+        </p:spPr>
+      </p:pic>
+      <p:pic>
+        <p:nvPicPr>
+          <p:cNvPr id="5" name="Imagem 4"/>
+          <p:cNvPicPr>
+            <a:picLocks noChangeAspect="1"/>
+          </p:cNvPicPr>
+          <p:nvPr/>
+        </p:nvPicPr>
+        <p:blipFill>
+          <a:blip r:embed="rId3"/>
+          <a:stretch>
+            <a:fillRect/>
+          </a:stretch>
+        </p:blipFill>
+        <p:spPr>
+          <a:xfrm>
+            <a:off x="186824" y="1138610"/>
+            <a:ext cx="7531487" cy="1657435"/>
+          </a:xfrm>
+          <a:prstGeom prst="rect">
+            <a:avLst/>
+          </a:prstGeom>
+        </p:spPr>
+      </p:pic>
+      <p:sp>
+        <p:nvSpPr>
+          <p:cNvPr id="6" name="Retângulo 5"/>
+          <p:cNvSpPr/>
+          <p:nvPr/>
+        </p:nvSpPr>
+        <p:spPr>
+          <a:xfrm>
+            <a:off x="8170606" y="1923433"/>
+            <a:ext cx="2349910" cy="373626"/>
+          </a:xfrm>
+          <a:prstGeom prst="rect">
+            <a:avLst/>
+          </a:prstGeom>
+          <a:noFill/>
+          <a:ln>
+            <a:solidFill>
+              <a:srgbClr val="FF0000"/>
+            </a:solidFill>
+          </a:ln>
+        </p:spPr>
+        <p:style>
+          <a:lnRef idx="2">
+            <a:schemeClr val="accent1">
+              <a:shade val="50000"/>
+            </a:schemeClr>
+          </a:lnRef>
+          <a:fillRef idx="1">
+            <a:schemeClr val="accent1"/>
+          </a:fillRef>
+          <a:effectRef idx="0">
+            <a:schemeClr val="accent1"/>
+          </a:effectRef>
+          <a:fontRef idx="minor">
+            <a:schemeClr val="lt1"/>
+          </a:fontRef>
+        </p:style>
+        <p:txBody>
+          <a:bodyPr rtlCol="0" anchor="ctr"/>
+          <a:lstStyle/>
+          <a:p>
+            <a:pPr algn="ctr"/>
+            <a:endParaRPr lang="pt-BR"/>
+          </a:p>
+        </p:txBody>
+      </p:sp>
+      <p:sp>
+        <p:nvSpPr>
+          <p:cNvPr id="7" name="Retângulo 6"/>
+          <p:cNvSpPr/>
+          <p:nvPr/>
+        </p:nvSpPr>
+        <p:spPr>
+          <a:xfrm>
+            <a:off x="3598606" y="1291097"/>
+            <a:ext cx="2349910" cy="373626"/>
+          </a:xfrm>
+          <a:prstGeom prst="rect">
+            <a:avLst/>
+          </a:prstGeom>
+          <a:noFill/>
+          <a:ln>
+            <a:solidFill>
+              <a:srgbClr val="FF0000"/>
+            </a:solidFill>
+          </a:ln>
+        </p:spPr>
+        <p:style>
+          <a:lnRef idx="2">
+            <a:schemeClr val="accent1">
+              <a:shade val="50000"/>
+            </a:schemeClr>
+          </a:lnRef>
+          <a:fillRef idx="1">
+            <a:schemeClr val="accent1"/>
+          </a:fillRef>
+          <a:effectRef idx="0">
+            <a:schemeClr val="accent1"/>
+          </a:effectRef>
+          <a:fontRef idx="minor">
+            <a:schemeClr val="lt1"/>
+          </a:fontRef>
+        </p:style>
+        <p:txBody>
+          <a:bodyPr rtlCol="0" anchor="ctr"/>
+          <a:lstStyle/>
+          <a:p>
+            <a:pPr algn="ctr"/>
+            <a:endParaRPr lang="pt-BR"/>
+          </a:p>
+        </p:txBody>
+      </p:sp>
+      <p:sp>
+        <p:nvSpPr>
+          <p:cNvPr id="8" name="Retângulo 7"/>
+          <p:cNvSpPr/>
+          <p:nvPr/>
+        </p:nvSpPr>
+        <p:spPr>
+          <a:xfrm>
+            <a:off x="1199534" y="1184082"/>
+            <a:ext cx="2349910" cy="373626"/>
+          </a:xfrm>
+          <a:prstGeom prst="rect">
+            <a:avLst/>
+          </a:prstGeom>
+          <a:noFill/>
+          <a:ln>
+            <a:solidFill>
+              <a:srgbClr val="FF0000"/>
+            </a:solidFill>
+          </a:ln>
+        </p:spPr>
+        <p:style>
+          <a:lnRef idx="2">
+            <a:schemeClr val="accent1">
+              <a:shade val="50000"/>
+            </a:schemeClr>
+          </a:lnRef>
+          <a:fillRef idx="1">
+            <a:schemeClr val="accent1"/>
+          </a:fillRef>
+          <a:effectRef idx="0">
+            <a:schemeClr val="accent1"/>
+          </a:effectRef>
+          <a:fontRef idx="minor">
+            <a:schemeClr val="lt1"/>
+          </a:fontRef>
+        </p:style>
+        <p:txBody>
+          <a:bodyPr rtlCol="0" anchor="ctr"/>
+          <a:lstStyle/>
+          <a:p>
+            <a:pPr algn="ctr"/>
+            <a:endParaRPr lang="pt-BR"/>
+          </a:p>
+        </p:txBody>
+      </p:sp>
+      <p:sp>
+        <p:nvSpPr>
+          <p:cNvPr id="9" name="Retângulo 8"/>
+          <p:cNvSpPr/>
+          <p:nvPr/>
+        </p:nvSpPr>
+        <p:spPr>
+          <a:xfrm>
+            <a:off x="1602657" y="2297059"/>
+            <a:ext cx="2349910" cy="373626"/>
+          </a:xfrm>
+          <a:prstGeom prst="rect">
+            <a:avLst/>
+          </a:prstGeom>
+          <a:noFill/>
+          <a:ln>
+            <a:solidFill>
+              <a:srgbClr val="FF0000"/>
+            </a:solidFill>
+          </a:ln>
+        </p:spPr>
+        <p:style>
+          <a:lnRef idx="2">
+            <a:schemeClr val="accent1">
+              <a:shade val="50000"/>
+            </a:schemeClr>
+          </a:lnRef>
+          <a:fillRef idx="1">
+            <a:schemeClr val="accent1"/>
+          </a:fillRef>
+          <a:effectRef idx="0">
+            <a:schemeClr val="accent1"/>
+          </a:effectRef>
+          <a:fontRef idx="minor">
+            <a:schemeClr val="lt1"/>
+          </a:fontRef>
+        </p:style>
+        <p:txBody>
+          <a:bodyPr rtlCol="0" anchor="ctr"/>
+          <a:lstStyle/>
+          <a:p>
+            <a:pPr algn="ctr"/>
             <a:endParaRPr lang="pt-BR"/>
           </a:p>
         </p:txBody>
@@ -3013,6 +3249,276 @@
     <p:extLst>
       <p:ext uri="{BB962C8B-B14F-4D97-AF65-F5344CB8AC3E}">
         <p14:creationId xmlns:p14="http://schemas.microsoft.com/office/powerpoint/2010/main" val="393903345"/>
+      </p:ext>
+    </p:extLst>
+  </p:cSld>
+  <p:clrMapOvr>
+    <a:masterClrMapping/>
+  </p:clrMapOvr>
+</p:sld>
+</file>
+
+<file path=ppt/slides/slide2.xml><?xml version="1.0" encoding="utf-8"?>
+<p:sld xmlns:a="http://schemas.openxmlformats.org/drawingml/2006/main" xmlns:r="http://schemas.openxmlformats.org/officeDocument/2006/relationships" xmlns:p="http://schemas.openxmlformats.org/presentationml/2006/main">
+  <p:cSld>
+    <p:spTree>
+      <p:nvGrpSpPr>
+        <p:cNvPr id="1" name=""/>
+        <p:cNvGrpSpPr/>
+        <p:nvPr/>
+      </p:nvGrpSpPr>
+      <p:grpSpPr>
+        <a:xfrm>
+          <a:off x="0" y="0"/>
+          <a:ext cx="0" cy="0"/>
+          <a:chOff x="0" y="0"/>
+          <a:chExt cx="0" cy="0"/>
+        </a:xfrm>
+      </p:grpSpPr>
+      <p:sp>
+        <p:nvSpPr>
+          <p:cNvPr id="2" name="Título 1"/>
+          <p:cNvSpPr>
+            <a:spLocks noGrp="1"/>
+          </p:cNvSpPr>
+          <p:nvPr>
+            <p:ph type="title"/>
+          </p:nvPr>
+        </p:nvSpPr>
+        <p:spPr>
+          <a:xfrm>
+            <a:off x="838200" y="365126"/>
+            <a:ext cx="6594987" cy="726256"/>
+          </a:xfrm>
+        </p:spPr>
+        <p:txBody>
+          <a:bodyPr>
+            <a:normAutofit/>
+          </a:bodyPr>
+          <a:lstStyle/>
+          <a:p>
+            <a:r>
+              <a:rPr lang="pt-BR" sz="1600" dirty="0"/>
+              <a:t>https://angular.io/api/forms/FormGroup</a:t>
+            </a:r>
+          </a:p>
+        </p:txBody>
+      </p:sp>
+      <p:sp>
+        <p:nvSpPr>
+          <p:cNvPr id="3" name="CaixaDeTexto 2"/>
+          <p:cNvSpPr txBox="1"/>
+          <p:nvPr/>
+        </p:nvSpPr>
+        <p:spPr>
+          <a:xfrm>
+            <a:off x="747251" y="1317523"/>
+            <a:ext cx="3839513" cy="369332"/>
+          </a:xfrm>
+          <a:prstGeom prst="rect">
+            <a:avLst/>
+          </a:prstGeom>
+          <a:noFill/>
+        </p:spPr>
+        <p:txBody>
+          <a:bodyPr wrap="none" rtlCol="0">
+            <a:spAutoFit/>
+          </a:bodyPr>
+          <a:lstStyle/>
+          <a:p>
+            <a:r>
+              <a:rPr lang="pt-BR" dirty="0"/>
+              <a:t>https://angular.io/api/forms/Validators</a:t>
+            </a:r>
+          </a:p>
+        </p:txBody>
+      </p:sp>
+      <p:sp>
+        <p:nvSpPr>
+          <p:cNvPr id="4" name="CaixaDeTexto 3"/>
+          <p:cNvSpPr txBox="1"/>
+          <p:nvPr/>
+        </p:nvSpPr>
+        <p:spPr>
+          <a:xfrm>
+            <a:off x="491613" y="1769807"/>
+            <a:ext cx="11169148" cy="1200329"/>
+          </a:xfrm>
+          <a:prstGeom prst="rect">
+            <a:avLst/>
+          </a:prstGeom>
+          <a:noFill/>
+        </p:spPr>
+        <p:txBody>
+          <a:bodyPr wrap="none" rtlCol="0">
+            <a:spAutoFit/>
+          </a:bodyPr>
+          <a:lstStyle/>
+          <a:p>
+            <a:r>
+              <a:rPr lang="pt-BR" dirty="0"/>
+              <a:t>  // referencia =&gt; https://developer.mozilla.org/en-US/docs/Web/JavaScript/Reference/Global_Objects/Object/assign</a:t>
+            </a:r>
+          </a:p>
+          <a:p>
+            <a:r>
+              <a:rPr lang="pt-BR" dirty="0"/>
+              <a:t>  // </a:t>
+            </a:r>
+            <a:r>
+              <a:rPr lang="pt-BR" dirty="0" err="1"/>
+              <a:t>this.usuario</a:t>
+            </a:r>
+            <a:r>
+              <a:rPr lang="pt-BR" dirty="0"/>
+              <a:t> = modelo chave e valor a função compara as propriedades de </a:t>
+            </a:r>
+            <a:r>
+              <a:rPr lang="pt-BR" dirty="0" err="1"/>
+              <a:t>usuario</a:t>
+            </a:r>
+            <a:endParaRPr lang="pt-BR" dirty="0"/>
+          </a:p>
+          <a:p>
+            <a:r>
+              <a:rPr lang="pt-BR" dirty="0"/>
+              <a:t>  // e ver quais são iguais em </a:t>
+            </a:r>
+            <a:r>
+              <a:rPr lang="pt-BR" dirty="0" err="1"/>
+              <a:t>cadastroGroup</a:t>
+            </a:r>
+            <a:r>
+              <a:rPr lang="pt-BR" dirty="0"/>
+              <a:t> e passa esses valores para o </a:t>
+            </a:r>
+            <a:r>
+              <a:rPr lang="pt-BR" dirty="0" err="1"/>
+              <a:t>this.usuario</a:t>
+            </a:r>
+            <a:endParaRPr lang="pt-BR" dirty="0"/>
+          </a:p>
+          <a:p>
+            <a:endParaRPr lang="pt-BR" dirty="0"/>
+          </a:p>
+        </p:txBody>
+      </p:sp>
+      <p:pic>
+        <p:nvPicPr>
+          <p:cNvPr id="5" name="Imagem 4"/>
+          <p:cNvPicPr>
+            <a:picLocks noChangeAspect="1"/>
+          </p:cNvPicPr>
+          <p:nvPr/>
+        </p:nvPicPr>
+        <p:blipFill>
+          <a:blip r:embed="rId2"/>
+          <a:stretch>
+            <a:fillRect/>
+          </a:stretch>
+        </p:blipFill>
+        <p:spPr>
+          <a:xfrm>
+            <a:off x="838200" y="3053088"/>
+            <a:ext cx="6140766" cy="1543129"/>
+          </a:xfrm>
+          <a:prstGeom prst="rect">
+            <a:avLst/>
+          </a:prstGeom>
+        </p:spPr>
+      </p:pic>
+    </p:spTree>
+    <p:extLst>
+      <p:ext uri="{BB962C8B-B14F-4D97-AF65-F5344CB8AC3E}">
+        <p14:creationId xmlns:p14="http://schemas.microsoft.com/office/powerpoint/2010/main" val="2562892485"/>
+      </p:ext>
+    </p:extLst>
+  </p:cSld>
+  <p:clrMapOvr>
+    <a:masterClrMapping/>
+  </p:clrMapOvr>
+</p:sld>
+</file>
+
+<file path=ppt/slides/slide3.xml><?xml version="1.0" encoding="utf-8"?>
+<p:sld xmlns:a="http://schemas.openxmlformats.org/drawingml/2006/main" xmlns:r="http://schemas.openxmlformats.org/officeDocument/2006/relationships" xmlns:p="http://schemas.openxmlformats.org/presentationml/2006/main">
+  <p:cSld>
+    <p:spTree>
+      <p:nvGrpSpPr>
+        <p:cNvPr id="1" name=""/>
+        <p:cNvGrpSpPr/>
+        <p:nvPr/>
+      </p:nvGrpSpPr>
+      <p:grpSpPr>
+        <a:xfrm>
+          <a:off x="0" y="0"/>
+          <a:ext cx="0" cy="0"/>
+          <a:chOff x="0" y="0"/>
+          <a:chExt cx="0" cy="0"/>
+        </a:xfrm>
+      </p:grpSpPr>
+      <p:sp>
+        <p:nvSpPr>
+          <p:cNvPr id="2" name="Título 1"/>
+          <p:cNvSpPr>
+            <a:spLocks noGrp="1"/>
+          </p:cNvSpPr>
+          <p:nvPr>
+            <p:ph type="title"/>
+          </p:nvPr>
+        </p:nvSpPr>
+        <p:spPr/>
+        <p:txBody>
+          <a:bodyPr/>
+          <a:lstStyle/>
+          <a:p>
+            <a:r>
+              <a:rPr lang="pt-BR" dirty="0" smtClean="0"/>
+              <a:t>Pacote para trabalhar com validações brasileiras</a:t>
+            </a:r>
+            <a:endParaRPr lang="pt-BR" dirty="0"/>
+          </a:p>
+        </p:txBody>
+      </p:sp>
+      <p:sp>
+        <p:nvSpPr>
+          <p:cNvPr id="3" name="Espaço Reservado para Conteúdo 2"/>
+          <p:cNvSpPr>
+            <a:spLocks noGrp="1"/>
+          </p:cNvSpPr>
+          <p:nvPr>
+            <p:ph idx="1"/>
+          </p:nvPr>
+        </p:nvSpPr>
+        <p:spPr/>
+        <p:txBody>
+          <a:bodyPr/>
+          <a:lstStyle/>
+          <a:p>
+            <a:r>
+              <a:rPr lang="pt-BR" dirty="0"/>
+              <a:t>npmjs.com/</a:t>
+            </a:r>
+            <a:r>
+              <a:rPr lang="pt-BR" dirty="0" err="1"/>
+              <a:t>package</a:t>
+            </a:r>
+            <a:r>
+              <a:rPr lang="pt-BR" dirty="0"/>
+              <a:t>/</a:t>
+            </a:r>
+            <a:r>
+              <a:rPr lang="pt-BR" dirty="0" err="1"/>
+              <a:t>ng-brazil</a:t>
+            </a:r>
+            <a:endParaRPr lang="pt-BR" dirty="0"/>
+          </a:p>
+        </p:txBody>
+      </p:sp>
+    </p:spTree>
+    <p:extLst>
+      <p:ext uri="{BB962C8B-B14F-4D97-AF65-F5344CB8AC3E}">
+        <p14:creationId xmlns:p14="http://schemas.microsoft.com/office/powerpoint/2010/main" val="3664423144"/>
       </p:ext>
     </p:extLst>
   </p:cSld>

</xml_diff>